<commit_message>
corrected misstake in OpenCV.pptx, Übersicht OpenCV Funktionen.png
</commit_message>
<xml_diff>
--- a/Anleitungen/OpenCV.pptx
+++ b/Anleitungen/OpenCV.pptx
@@ -198,7 +198,7 @@
           <a:p>
             <a:fld id="{EBA4F877-1B7A-449D-B6A5-194EF70C4581}" type="datetimeFigureOut">
               <a:rPr lang="de-DE" smtClean="0"/>
-              <a:t>13.03.2017</a:t>
+              <a:t>16.03.2017</a:t>
             </a:fld>
             <a:endParaRPr lang="de-DE"/>
           </a:p>
@@ -934,7 +934,7 @@
           <a:p>
             <a:fld id="{71D5E468-CE78-4192-89EA-B7B0F6DCBF50}" type="datetimeFigureOut">
               <a:rPr lang="de-DE" smtClean="0"/>
-              <a:t>13.03.2017</a:t>
+              <a:t>16.03.2017</a:t>
             </a:fld>
             <a:endParaRPr lang="de-DE"/>
           </a:p>
@@ -1099,7 +1099,7 @@
           <a:p>
             <a:fld id="{71D5E468-CE78-4192-89EA-B7B0F6DCBF50}" type="datetimeFigureOut">
               <a:rPr lang="de-DE" smtClean="0"/>
-              <a:t>13.03.2017</a:t>
+              <a:t>16.03.2017</a:t>
             </a:fld>
             <a:endParaRPr lang="de-DE"/>
           </a:p>
@@ -1274,7 +1274,7 @@
           <a:p>
             <a:fld id="{71D5E468-CE78-4192-89EA-B7B0F6DCBF50}" type="datetimeFigureOut">
               <a:rPr lang="de-DE" smtClean="0"/>
-              <a:t>13.03.2017</a:t>
+              <a:t>16.03.2017</a:t>
             </a:fld>
             <a:endParaRPr lang="de-DE"/>
           </a:p>
@@ -1443,7 +1443,7 @@
           <a:p>
             <a:fld id="{71D5E468-CE78-4192-89EA-B7B0F6DCBF50}" type="datetimeFigureOut">
               <a:rPr lang="de-DE" smtClean="0"/>
-              <a:t>13.03.2017</a:t>
+              <a:t>16.03.2017</a:t>
             </a:fld>
             <a:endParaRPr lang="de-DE"/>
           </a:p>
@@ -1898,7 +1898,7 @@
           <a:p>
             <a:fld id="{71D5E468-CE78-4192-89EA-B7B0F6DCBF50}" type="datetimeFigureOut">
               <a:rPr lang="de-DE" smtClean="0"/>
-              <a:t>13.03.2017</a:t>
+              <a:t>16.03.2017</a:t>
             </a:fld>
             <a:endParaRPr lang="de-DE"/>
           </a:p>
@@ -2162,7 +2162,7 @@
           <a:p>
             <a:fld id="{71D5E468-CE78-4192-89EA-B7B0F6DCBF50}" type="datetimeFigureOut">
               <a:rPr lang="de-DE" smtClean="0"/>
-              <a:t>13.03.2017</a:t>
+              <a:t>16.03.2017</a:t>
             </a:fld>
             <a:endParaRPr lang="de-DE"/>
           </a:p>
@@ -2536,7 +2536,7 @@
           <a:p>
             <a:fld id="{71D5E468-CE78-4192-89EA-B7B0F6DCBF50}" type="datetimeFigureOut">
               <a:rPr lang="de-DE" smtClean="0"/>
-              <a:t>13.03.2017</a:t>
+              <a:t>16.03.2017</a:t>
             </a:fld>
             <a:endParaRPr lang="de-DE"/>
           </a:p>
@@ -2658,7 +2658,7 @@
           <a:p>
             <a:fld id="{71D5E468-CE78-4192-89EA-B7B0F6DCBF50}" type="datetimeFigureOut">
               <a:rPr lang="de-DE" smtClean="0"/>
-              <a:t>13.03.2017</a:t>
+              <a:t>16.03.2017</a:t>
             </a:fld>
             <a:endParaRPr lang="de-DE"/>
           </a:p>
@@ -2748,7 +2748,7 @@
           <a:p>
             <a:fld id="{71D5E468-CE78-4192-89EA-B7B0F6DCBF50}" type="datetimeFigureOut">
               <a:rPr lang="de-DE" smtClean="0"/>
-              <a:t>13.03.2017</a:t>
+              <a:t>16.03.2017</a:t>
             </a:fld>
             <a:endParaRPr lang="de-DE"/>
           </a:p>
@@ -2997,7 +2997,7 @@
           <a:p>
             <a:fld id="{71D5E468-CE78-4192-89EA-B7B0F6DCBF50}" type="datetimeFigureOut">
               <a:rPr lang="de-DE" smtClean="0"/>
-              <a:t>13.03.2017</a:t>
+              <a:t>16.03.2017</a:t>
             </a:fld>
             <a:endParaRPr lang="de-DE"/>
           </a:p>
@@ -3256,7 +3256,7 @@
           <a:p>
             <a:fld id="{71D5E468-CE78-4192-89EA-B7B0F6DCBF50}" type="datetimeFigureOut">
               <a:rPr lang="de-DE" smtClean="0"/>
-              <a:t>13.03.2017</a:t>
+              <a:t>16.03.2017</a:t>
             </a:fld>
             <a:endParaRPr lang="de-DE"/>
           </a:p>
@@ -3660,7 +3660,7 @@
           <a:p>
             <a:fld id="{71D5E468-CE78-4192-89EA-B7B0F6DCBF50}" type="datetimeFigureOut">
               <a:rPr lang="de-DE" smtClean="0"/>
-              <a:t>13.03.2017</a:t>
+              <a:t>16.03.2017</a:t>
             </a:fld>
             <a:endParaRPr lang="de-DE"/>
           </a:p>
@@ -4102,7 +4102,6 @@
               <a:rPr lang="de-DE" dirty="0"/>
               <a:t>http://docs.opencv.org/3.2.0/</a:t>
             </a:r>
-            <a:endParaRPr lang="de-DE" dirty="0"/>
           </a:p>
         </p:txBody>
       </p:sp>
@@ -4116,13 +4115,13 @@
   <p:clrMapOvr>
     <a:masterClrMapping/>
   </p:clrMapOvr>
-  <mc:AlternateContent xmlns:mc="http://schemas.openxmlformats.org/markup-compatibility/2006">
-    <mc:Choice xmlns:p14="http://schemas.microsoft.com/office/powerpoint/2010/main" Requires="p14">
+  <mc:AlternateContent xmlns:mc="http://schemas.openxmlformats.org/markup-compatibility/2006" xmlns:p14="http://schemas.microsoft.com/office/powerpoint/2010/main">
+    <mc:Choice Requires="p14">
       <p:transition spd="slow" p14:dur="1200">
         <p:dissolve/>
       </p:transition>
     </mc:Choice>
-    <mc:Fallback>
+    <mc:Fallback xmlns="">
       <p:transition spd="slow">
         <p:dissolve/>
       </p:transition>
@@ -4328,13 +4327,13 @@
   <p:clrMapOvr>
     <a:masterClrMapping/>
   </p:clrMapOvr>
-  <mc:AlternateContent xmlns:mc="http://schemas.openxmlformats.org/markup-compatibility/2006">
-    <mc:Choice xmlns:p14="http://schemas.microsoft.com/office/powerpoint/2010/main" Requires="p14">
+  <mc:AlternateContent xmlns:mc="http://schemas.openxmlformats.org/markup-compatibility/2006" xmlns:p14="http://schemas.microsoft.com/office/powerpoint/2010/main">
+    <mc:Choice Requires="p14">
       <p:transition spd="slow" p14:dur="1200">
         <p:dissolve/>
       </p:transition>
     </mc:Choice>
-    <mc:Fallback>
+    <mc:Fallback xmlns="">
       <p:transition spd="slow">
         <p:dissolve/>
       </p:transition>
@@ -5086,13 +5085,13 @@
   <p:clrMapOvr>
     <a:masterClrMapping/>
   </p:clrMapOvr>
-  <mc:AlternateContent xmlns:mc="http://schemas.openxmlformats.org/markup-compatibility/2006">
-    <mc:Choice xmlns:p14="http://schemas.microsoft.com/office/powerpoint/2010/main" Requires="p14">
+  <mc:AlternateContent xmlns:mc="http://schemas.openxmlformats.org/markup-compatibility/2006" xmlns:p14="http://schemas.microsoft.com/office/powerpoint/2010/main">
+    <mc:Choice Requires="p14">
       <p:transition spd="slow" p14:dur="1200">
         <p:dissolve/>
       </p:transition>
     </mc:Choice>
-    <mc:Fallback>
+    <mc:Fallback xmlns="">
       <p:transition spd="slow">
         <p:dissolve/>
       </p:transition>
@@ -5941,13 +5940,13 @@
   <p:clrMapOvr>
     <a:masterClrMapping/>
   </p:clrMapOvr>
-  <mc:AlternateContent xmlns:mc="http://schemas.openxmlformats.org/markup-compatibility/2006">
-    <mc:Choice xmlns:p14="http://schemas.microsoft.com/office/powerpoint/2010/main" Requires="p14">
+  <mc:AlternateContent xmlns:mc="http://schemas.openxmlformats.org/markup-compatibility/2006" xmlns:p14="http://schemas.microsoft.com/office/powerpoint/2010/main">
+    <mc:Choice Requires="p14">
       <p:transition spd="slow" p14:dur="1200">
         <p:dissolve/>
       </p:transition>
     </mc:Choice>
-    <mc:Fallback>
+    <mc:Fallback xmlns="">
       <p:transition spd="slow">
         <p:dissolve/>
       </p:transition>
@@ -6463,7 +6462,6 @@
               <a:rPr lang="de-DE" dirty="0" smtClean="0"/>
               <a:t>])</a:t>
             </a:r>
-            <a:endParaRPr lang="de-DE" dirty="0" smtClean="0"/>
           </a:p>
           <a:p>
             <a:endParaRPr lang="de-DE" dirty="0"/>
@@ -6480,13 +6478,13 @@
   <p:clrMapOvr>
     <a:masterClrMapping/>
   </p:clrMapOvr>
-  <mc:AlternateContent xmlns:mc="http://schemas.openxmlformats.org/markup-compatibility/2006">
-    <mc:Choice xmlns:p14="http://schemas.microsoft.com/office/powerpoint/2010/main" Requires="p14">
+  <mc:AlternateContent xmlns:mc="http://schemas.openxmlformats.org/markup-compatibility/2006" xmlns:p14="http://schemas.microsoft.com/office/powerpoint/2010/main">
+    <mc:Choice Requires="p14">
       <p:transition spd="slow" p14:dur="1200">
         <p:dissolve/>
       </p:transition>
     </mc:Choice>
-    <mc:Fallback>
+    <mc:Fallback xmlns="">
       <p:transition spd="slow">
         <p:dissolve/>
       </p:transition>
@@ -6873,13 +6871,13 @@
   <p:clrMapOvr>
     <a:masterClrMapping/>
   </p:clrMapOvr>
-  <mc:AlternateContent xmlns:mc="http://schemas.openxmlformats.org/markup-compatibility/2006">
-    <mc:Choice xmlns:p14="http://schemas.microsoft.com/office/powerpoint/2010/main" Requires="p14">
+  <mc:AlternateContent xmlns:mc="http://schemas.openxmlformats.org/markup-compatibility/2006" xmlns:p14="http://schemas.microsoft.com/office/powerpoint/2010/main">
+    <mc:Choice Requires="p14">
       <p:transition spd="slow" p14:dur="1200">
         <p:dissolve/>
       </p:transition>
     </mc:Choice>
-    <mc:Fallback>
+    <mc:Fallback xmlns="">
       <p:transition spd="slow">
         <p:dissolve/>
       </p:transition>
@@ -7295,7 +7293,7 @@
               </a:spcAft>
             </a:pPr>
             <a:r>
-              <a:rPr lang="de-DE" altLang="de-DE" sz="1000" dirty="0" smtClean="0">
+              <a:rPr lang="de-DE" altLang="de-DE" sz="1000" smtClean="0">
                 <a:solidFill>
                   <a:srgbClr val="A9B7C6"/>
                 </a:solidFill>
@@ -7305,18 +7303,18 @@
               <a:t>        </a:t>
             </a:r>
             <a:r>
-              <a:rPr kumimoji="0" lang="de-DE" altLang="de-DE" sz="1000" b="0" i="0" u="none" strike="noStrike" cap="none" normalizeH="0" baseline="0" dirty="0" smtClean="0">
-                <a:ln>
-                  <a:noFill/>
-                </a:ln>
-                <a:solidFill>
-                  <a:srgbClr val="A9B7C6"/>
-                </a:solidFill>
-                <a:effectLst/>
-                <a:latin typeface="Consolas" pitchFamily="49" charset="0"/>
-                <a:cs typeface="Arial" pitchFamily="34" charset="0"/>
-              </a:rPr>
-              <a:t>cv2.resize(</a:t>
+              <a:rPr kumimoji="0" lang="de-DE" altLang="de-DE" sz="1000" b="0" i="0" u="none" strike="noStrike" cap="none" normalizeH="0" baseline="0" smtClean="0">
+                <a:ln>
+                  <a:noFill/>
+                </a:ln>
+                <a:solidFill>
+                  <a:srgbClr val="A9B7C6"/>
+                </a:solidFill>
+                <a:effectLst/>
+                <a:latin typeface="Consolas" pitchFamily="49" charset="0"/>
+                <a:cs typeface="Arial" pitchFamily="34" charset="0"/>
+              </a:rPr>
+              <a:t>cv2.resizeWindow(</a:t>
             </a:r>
             <a:r>
               <a:rPr kumimoji="0" lang="de-DE" altLang="de-DE" sz="1000" b="0" i="0" u="none" strike="noStrike" cap="none" normalizeH="0" baseline="0" dirty="0" err="1" smtClean="0">
@@ -12432,13 +12430,13 @@
   <p:clrMapOvr>
     <a:masterClrMapping/>
   </p:clrMapOvr>
-  <mc:AlternateContent xmlns:mc="http://schemas.openxmlformats.org/markup-compatibility/2006">
-    <mc:Choice xmlns:p14="http://schemas.microsoft.com/office/powerpoint/2010/main" Requires="p14">
+  <mc:AlternateContent xmlns:mc="http://schemas.openxmlformats.org/markup-compatibility/2006" xmlns:p14="http://schemas.microsoft.com/office/powerpoint/2010/main">
+    <mc:Choice Requires="p14">
       <p:transition spd="slow" p14:dur="1200">
         <p:dissolve/>
       </p:transition>
     </mc:Choice>
-    <mc:Fallback>
+    <mc:Fallback xmlns="">
       <p:transition spd="slow">
         <p:dissolve/>
       </p:transition>

</xml_diff>